<commit_message>
added email address to slides
</commit_message>
<xml_diff>
--- a/LSL-2/lsl-2.pptx
+++ b/LSL-2/lsl-2.pptx
@@ -6908,6 +6908,33 @@
               </a:rPr>
               <a:t>https://github.com/Diademics-Pty-Ltd/BrainProducts_BCI_Event</a:t>
             </a:r>
+            <a:endParaRPr lang="en-US" dirty="0">
+              <a:latin typeface="Univers" panose="020B0503020202020204" pitchFamily="34" charset="0"/>
+            </a:endParaRPr>
+          </a:p>
+          <a:p>
+            <a:pPr marL="0" indent="0">
+              <a:buNone/>
+            </a:pPr>
+            <a:endParaRPr lang="en-US" dirty="0">
+              <a:latin typeface="Univers" panose="020B0503020202020204" pitchFamily="34" charset="0"/>
+            </a:endParaRPr>
+          </a:p>
+          <a:p>
+            <a:pPr marL="0" indent="0">
+              <a:buNone/>
+            </a:pPr>
+            <a:r>
+              <a:rPr lang="en-US">
+                <a:latin typeface="Univers" panose="020B0503020202020204" pitchFamily="34" charset="0"/>
+              </a:rPr>
+              <a:t>You may contact me by email at david.medine@diademics.com</a:t>
+            </a:r>
+          </a:p>
+          <a:p>
+            <a:pPr marL="0" indent="0">
+              <a:buNone/>
+            </a:pPr>
             <a:endParaRPr lang="en-US" dirty="0">
               <a:latin typeface="Univers" panose="020B0503020202020204" pitchFamily="34" charset="0"/>
             </a:endParaRPr>

</xml_diff>

<commit_message>
added copyright in title footer
</commit_message>
<xml_diff>
--- a/LSL-2/lsl-2.pptx
+++ b/LSL-2/lsl-2.pptx
@@ -4056,6 +4056,45 @@
           </a:prstGeom>
         </p:spPr>
       </p:pic>
+      <p:sp>
+        <p:nvSpPr>
+          <p:cNvPr id="2" name="Footer Placeholder 1">
+            <a:extLst>
+              <a:ext uri="{FF2B5EF4-FFF2-40B4-BE49-F238E27FC236}">
+                <a16:creationId xmlns:a16="http://schemas.microsoft.com/office/drawing/2014/main" id="{6FC20450-10D7-4E22-AB23-4FDA16C381E9}"/>
+              </a:ext>
+            </a:extLst>
+          </p:cNvPr>
+          <p:cNvSpPr>
+            <a:spLocks noGrp="1"/>
+          </p:cNvSpPr>
+          <p:nvPr>
+            <p:ph type="ftr" sz="quarter" idx="11"/>
+          </p:nvPr>
+        </p:nvSpPr>
+        <p:spPr/>
+        <p:txBody>
+          <a:bodyPr/>
+          <a:lstStyle/>
+          <a:p>
+            <a:r>
+              <a:rPr lang="en-US" dirty="0"/>
+              <a:t>Copyright 2021 </a:t>
+            </a:r>
+            <a:r>
+              <a:rPr lang="en-US" dirty="0" err="1"/>
+              <a:t>Diademics</a:t>
+            </a:r>
+            <a:r>
+              <a:rPr lang="en-US"/>
+              <a:t> Pty Ltd</a:t>
+            </a:r>
+          </a:p>
+          <a:p>
+            <a:endParaRPr lang="en-US"/>
+          </a:p>
+        </p:txBody>
+      </p:sp>
     </p:spTree>
     <p:extLst>
       <p:ext uri="{BB962C8B-B14F-4D97-AF65-F5344CB8AC3E}">
@@ -6925,7 +6964,7 @@
               <a:buNone/>
             </a:pPr>
             <a:r>
-              <a:rPr lang="en-US">
+              <a:rPr lang="en-US" dirty="0">
                 <a:latin typeface="Univers" panose="020B0503020202020204" pitchFamily="34" charset="0"/>
               </a:rPr>
               <a:t>You may contact me by email at david.medine@diademics.com</a:t>

</xml_diff>